<commit_message>
Fix spelling mistake and other bug Successfully
</commit_message>
<xml_diff>
--- a/Presentation1.pptx
+++ b/Presentation1.pptx
@@ -3745,13 +3745,8 @@
             <a:pPr algn="ctr"/>
             <a:r>
               <a:rPr lang="en-US" sz="1400" b="1" dirty="0"/>
-              <a:t>Local </a:t>
-            </a:r>
-            <a:r>
-              <a:rPr lang="en-US" sz="1400" b="1" dirty="0" err="1"/>
-              <a:t>Respitory</a:t>
-            </a:r>
-            <a:endParaRPr lang="en-US" sz="1400" b="1" dirty="0"/>
+              <a:t>Local Repository</a:t>
+            </a:r>
           </a:p>
         </p:txBody>
       </p:sp>
@@ -3800,13 +3795,8 @@
             <a:pPr algn="ctr"/>
             <a:r>
               <a:rPr lang="en-US" sz="1400" b="1" dirty="0"/>
-              <a:t>Remote </a:t>
-            </a:r>
-            <a:r>
-              <a:rPr lang="en-US" sz="1400" b="1" dirty="0" err="1"/>
-              <a:t>Respitory</a:t>
-            </a:r>
-            <a:endParaRPr lang="en-US" sz="1400" b="1" dirty="0"/>
+              <a:t>Remote Repository</a:t>
+            </a:r>
           </a:p>
         </p:txBody>
       </p:sp>
@@ -4690,13 +4680,8 @@
             <a:pPr algn="ctr"/>
             <a:r>
               <a:rPr lang="en-US" b="1" dirty="0"/>
-              <a:t>Other Remote </a:t>
-            </a:r>
-            <a:r>
-              <a:rPr lang="en-US" b="1" dirty="0" err="1"/>
-              <a:t>Respitory</a:t>
-            </a:r>
-            <a:endParaRPr lang="en-US" b="1" dirty="0"/>
+              <a:t>Other Remote Repository</a:t>
+            </a:r>
           </a:p>
         </p:txBody>
       </p:sp>
@@ -4748,13 +4733,8 @@
             <a:pPr algn="ctr"/>
             <a:r>
               <a:rPr lang="en-US" b="1" dirty="0"/>
-              <a:t>My Remote </a:t>
-            </a:r>
-            <a:r>
-              <a:rPr lang="en-US" b="1" dirty="0" err="1"/>
-              <a:t>Respitory</a:t>
-            </a:r>
-            <a:endParaRPr lang="en-US" b="1" dirty="0"/>
+              <a:t>My Remote Repository</a:t>
+            </a:r>
           </a:p>
         </p:txBody>
       </p:sp>
@@ -4805,20 +4785,8 @@
           <a:p>
             <a:pPr algn="ctr"/>
             <a:r>
-              <a:rPr lang="en-US" b="1" dirty="0"/>
-              <a:t>Local </a:t>
-            </a:r>
-            <a:r>
-              <a:rPr lang="en-US" b="1" dirty="0" err="1"/>
-              <a:t>Respitory</a:t>
-            </a:r>
-            <a:r>
-              <a:rPr lang="en-US" b="1" dirty="0"/>
-              <a:t> </a:t>
-            </a:r>
-            <a:r>
-              <a:rPr lang="en-US" b="1" dirty="0" err="1"/>
-              <a:t>Respitory</a:t>
+              <a:rPr lang="en-US" b="1"/>
+              <a:t>Local Repository</a:t>
             </a:r>
             <a:endParaRPr lang="en-US" b="1" dirty="0"/>
           </a:p>

</xml_diff>